<commit_message>
upload iris data 3
</commit_message>
<xml_diff>
--- a/teaching/2017FALL/HW/HW2/Presentation1.pptx
+++ b/teaching/2017FALL/HW/HW2/Presentation1.pptx
@@ -104,6 +104,11 @@
       </a:defRPr>
     </a:lvl9pPr>
   </p:defaultTextStyle>
+  <p:extLst>
+    <p:ext uri="{EFAFB233-063F-42B5-8137-9DF3F51BA10A}">
+      <p15:sldGuideLst xmlns:p15="http://schemas.microsoft.com/office/powerpoint/2012/main"/>
+    </p:ext>
+  </p:extLst>
 </p:presentation>
 </file>
 
@@ -2986,8 +2991,8 @@
         </p:blipFill>
         <p:spPr>
           <a:xfrm>
-            <a:off x="961858" y="1118937"/>
-            <a:ext cx="5944268" cy="3344815"/>
+            <a:off x="961858" y="1118938"/>
+            <a:ext cx="3164541" cy="1780674"/>
           </a:xfrm>
           <a:prstGeom prst="rect">
             <a:avLst/>
@@ -3016,8 +3021,8 @@
         </p:blipFill>
         <p:spPr>
           <a:xfrm>
-            <a:off x="7319877" y="1118937"/>
-            <a:ext cx="3100773" cy="3344815"/>
+            <a:off x="4528316" y="1118937"/>
+            <a:ext cx="1650754" cy="1780674"/>
           </a:xfrm>
           <a:prstGeom prst="rect">
             <a:avLst/>
@@ -3062,7 +3067,7 @@
         </p:nvSpPr>
         <p:spPr>
           <a:xfrm>
-            <a:off x="6829925" y="657272"/>
+            <a:off x="4078271" y="664839"/>
             <a:ext cx="1383632" cy="461665"/>
           </a:xfrm>
           <a:prstGeom prst="rect">

</xml_diff>

<commit_message>
upload iris data 4
</commit_message>
<xml_diff>
--- a/teaching/2017FALL/HW/HW2/Presentation1.pptx
+++ b/teaching/2017FALL/HW/HW2/Presentation1.pptx
@@ -2991,8 +2991,8 @@
         </p:blipFill>
         <p:spPr>
           <a:xfrm>
-            <a:off x="961858" y="1118938"/>
-            <a:ext cx="3164541" cy="1780674"/>
+            <a:off x="961858" y="1118937"/>
+            <a:ext cx="4235419" cy="2383253"/>
           </a:xfrm>
           <a:prstGeom prst="rect">
             <a:avLst/>
@@ -3021,8 +3021,8 @@
         </p:blipFill>
         <p:spPr>
           <a:xfrm>
-            <a:off x="4528316" y="1118937"/>
-            <a:ext cx="1650754" cy="1780674"/>
+            <a:off x="5502005" y="1126504"/>
+            <a:ext cx="2209368" cy="2383253"/>
           </a:xfrm>
           <a:prstGeom prst="rect">
             <a:avLst/>
@@ -3067,7 +3067,7 @@
         </p:nvSpPr>
         <p:spPr>
           <a:xfrm>
-            <a:off x="4078271" y="664839"/>
+            <a:off x="5112987" y="652807"/>
             <a:ext cx="1383632" cy="461665"/>
           </a:xfrm>
           <a:prstGeom prst="rect">

</xml_diff>